<commit_message>
Erste Version Präsentation Milestone 1 aus Semester 2
Präsentation für den 04.04.2017
</commit_message>
<xml_diff>
--- a/Non-Code (Doku usw.)/Präsentationen/Abschlusspräsentation STEP 2.pptx
+++ b/Non-Code (Doku usw.)/Präsentationen/Abschlusspräsentation STEP 2.pptx
@@ -4920,17 +4920,17 @@
     </dgm:pt>
   </dgm:ptLst>
   <dgm:cxnLst>
+    <dgm:cxn modelId="{D3D68609-AFB3-45F4-A927-9E1E36E1ADB7}" srcId="{43E2B7A1-61E9-401B-A103-35447287B830}" destId="{143DE9F6-9345-4FC5-BDE1-871FE991D82A}" srcOrd="1" destOrd="0" parTransId="{BE05C30A-9B33-4972-8281-BC756A352B11}" sibTransId="{0F24F9C1-504D-4E89-964F-DA708A97717F}"/>
+    <dgm:cxn modelId="{8576CC28-9F2D-4081-8BFD-B615BCFCC729}" type="presOf" srcId="{6DBA4E0F-9AB4-417A-BAB0-BD2998AE047C}" destId="{534F45A4-7A18-4428-B2AC-B8559A21B4FC}" srcOrd="0" destOrd="0" presId="urn:microsoft.com/office/officeart/2005/8/layout/chevron1"/>
+    <dgm:cxn modelId="{64D84D35-D400-4B49-B970-DE3027E479A4}" srcId="{43E2B7A1-61E9-401B-A103-35447287B830}" destId="{722F3EE7-F1ED-4747-BABE-D5193433A6C2}" srcOrd="0" destOrd="0" parTransId="{079B3C7F-773A-4569-8977-38CAD2A0016C}" sibTransId="{0A5DA1F5-A8B7-4259-A57A-00A859DB6313}"/>
+    <dgm:cxn modelId="{34753739-7E7C-45FA-BEB6-4C7A7713A3ED}" srcId="{43E2B7A1-61E9-401B-A103-35447287B830}" destId="{6DBA4E0F-9AB4-417A-BAB0-BD2998AE047C}" srcOrd="4" destOrd="0" parTransId="{BBF31F1A-D65D-407B-AFFA-C1477929DF86}" sibTransId="{25B9C40F-6A17-48A0-815D-C59C690D439B}"/>
+    <dgm:cxn modelId="{6871FF62-8AE0-4795-81ED-E187D332F61B}" srcId="{43E2B7A1-61E9-401B-A103-35447287B830}" destId="{D1D8320B-91D2-4486-9399-1F09FB851A26}" srcOrd="3" destOrd="0" parTransId="{C70193BE-8D38-4C88-8023-5ECBBA60061F}" sibTransId="{0D639B99-DF7C-4EE8-BB33-94D79B8695A4}"/>
     <dgm:cxn modelId="{DD324545-A34A-4142-98E8-4920D4C782FB}" srcId="{43E2B7A1-61E9-401B-A103-35447287B830}" destId="{DCCC4955-40A3-45B9-A356-D8F9A19CF521}" srcOrd="2" destOrd="0" parTransId="{9451B6CA-DF5F-42B9-9145-57A67BECB728}" sibTransId="{847CAA7A-0133-4147-84B7-998E29533329}"/>
+    <dgm:cxn modelId="{8EB2EF4A-CD1C-4CA3-A50A-8C881E6C78A9}" type="presOf" srcId="{722F3EE7-F1ED-4747-BABE-D5193433A6C2}" destId="{7FAAC15B-B09D-4273-B8BB-7AA09C9943EB}" srcOrd="0" destOrd="0" presId="urn:microsoft.com/office/officeart/2005/8/layout/chevron1"/>
+    <dgm:cxn modelId="{03D70354-D445-4D6D-B914-1C599389A667}" type="presOf" srcId="{143DE9F6-9345-4FC5-BDE1-871FE991D82A}" destId="{4ECCB1E8-A330-477B-920F-3C5B7E51EA28}" srcOrd="0" destOrd="0" presId="urn:microsoft.com/office/officeart/2005/8/layout/chevron1"/>
+    <dgm:cxn modelId="{076778DA-C266-45F1-8BD2-37DFC97A0F7F}" type="presOf" srcId="{D1D8320B-91D2-4486-9399-1F09FB851A26}" destId="{0B9EDCF6-A386-4969-BCE7-DF6F75AF55A9}" srcOrd="0" destOrd="0" presId="urn:microsoft.com/office/officeart/2005/8/layout/chevron1"/>
     <dgm:cxn modelId="{F1BF83E2-4BEF-4E81-9F33-F761F1B4EAF6}" type="presOf" srcId="{DCCC4955-40A3-45B9-A356-D8F9A19CF521}" destId="{18E79364-485C-4E2E-9F27-C66EEB9262E5}" srcOrd="0" destOrd="0" presId="urn:microsoft.com/office/officeart/2005/8/layout/chevron1"/>
-    <dgm:cxn modelId="{D3D68609-AFB3-45F4-A927-9E1E36E1ADB7}" srcId="{43E2B7A1-61E9-401B-A103-35447287B830}" destId="{143DE9F6-9345-4FC5-BDE1-871FE991D82A}" srcOrd="1" destOrd="0" parTransId="{BE05C30A-9B33-4972-8281-BC756A352B11}" sibTransId="{0F24F9C1-504D-4E89-964F-DA708A97717F}"/>
-    <dgm:cxn modelId="{34753739-7E7C-45FA-BEB6-4C7A7713A3ED}" srcId="{43E2B7A1-61E9-401B-A103-35447287B830}" destId="{6DBA4E0F-9AB4-417A-BAB0-BD2998AE047C}" srcOrd="4" destOrd="0" parTransId="{BBF31F1A-D65D-407B-AFFA-C1477929DF86}" sibTransId="{25B9C40F-6A17-48A0-815D-C59C690D439B}"/>
-    <dgm:cxn modelId="{076778DA-C266-45F1-8BD2-37DFC97A0F7F}" type="presOf" srcId="{D1D8320B-91D2-4486-9399-1F09FB851A26}" destId="{0B9EDCF6-A386-4969-BCE7-DF6F75AF55A9}" srcOrd="0" destOrd="0" presId="urn:microsoft.com/office/officeart/2005/8/layout/chevron1"/>
     <dgm:cxn modelId="{DCA339E9-DC34-44B8-95E2-671C252A8FB5}" type="presOf" srcId="{43E2B7A1-61E9-401B-A103-35447287B830}" destId="{364A076C-A699-46C5-9AEC-AB4BCAB43E30}" srcOrd="0" destOrd="0" presId="urn:microsoft.com/office/officeart/2005/8/layout/chevron1"/>
-    <dgm:cxn modelId="{6871FF62-8AE0-4795-81ED-E187D332F61B}" srcId="{43E2B7A1-61E9-401B-A103-35447287B830}" destId="{D1D8320B-91D2-4486-9399-1F09FB851A26}" srcOrd="3" destOrd="0" parTransId="{C70193BE-8D38-4C88-8023-5ECBBA60061F}" sibTransId="{0D639B99-DF7C-4EE8-BB33-94D79B8695A4}"/>
-    <dgm:cxn modelId="{8576CC28-9F2D-4081-8BFD-B615BCFCC729}" type="presOf" srcId="{6DBA4E0F-9AB4-417A-BAB0-BD2998AE047C}" destId="{534F45A4-7A18-4428-B2AC-B8559A21B4FC}" srcOrd="0" destOrd="0" presId="urn:microsoft.com/office/officeart/2005/8/layout/chevron1"/>
-    <dgm:cxn modelId="{8EB2EF4A-CD1C-4CA3-A50A-8C881E6C78A9}" type="presOf" srcId="{722F3EE7-F1ED-4747-BABE-D5193433A6C2}" destId="{7FAAC15B-B09D-4273-B8BB-7AA09C9943EB}" srcOrd="0" destOrd="0" presId="urn:microsoft.com/office/officeart/2005/8/layout/chevron1"/>
-    <dgm:cxn modelId="{64D84D35-D400-4B49-B970-DE3027E479A4}" srcId="{43E2B7A1-61E9-401B-A103-35447287B830}" destId="{722F3EE7-F1ED-4747-BABE-D5193433A6C2}" srcOrd="0" destOrd="0" parTransId="{079B3C7F-773A-4569-8977-38CAD2A0016C}" sibTransId="{0A5DA1F5-A8B7-4259-A57A-00A859DB6313}"/>
-    <dgm:cxn modelId="{03D70354-D445-4D6D-B914-1C599389A667}" type="presOf" srcId="{143DE9F6-9345-4FC5-BDE1-871FE991D82A}" destId="{4ECCB1E8-A330-477B-920F-3C5B7E51EA28}" srcOrd="0" destOrd="0" presId="urn:microsoft.com/office/officeart/2005/8/layout/chevron1"/>
     <dgm:cxn modelId="{E2111D49-2BCB-4499-80D5-471768C74171}" type="presParOf" srcId="{364A076C-A699-46C5-9AEC-AB4BCAB43E30}" destId="{7FAAC15B-B09D-4273-B8BB-7AA09C9943EB}" srcOrd="0" destOrd="0" presId="urn:microsoft.com/office/officeart/2005/8/layout/chevron1"/>
     <dgm:cxn modelId="{B395AC1E-2B1A-43AB-8ABA-F1B125B49E96}" type="presParOf" srcId="{364A076C-A699-46C5-9AEC-AB4BCAB43E30}" destId="{72E59707-FD57-4ACB-ABFC-B168665EEEAF}" srcOrd="1" destOrd="0" presId="urn:microsoft.com/office/officeart/2005/8/layout/chevron1"/>
     <dgm:cxn modelId="{42008BE1-4C43-4A03-B03F-B54DDC51C308}" type="presParOf" srcId="{364A076C-A699-46C5-9AEC-AB4BCAB43E30}" destId="{4ECCB1E8-A330-477B-920F-3C5B7E51EA28}" srcOrd="2" destOrd="0" presId="urn:microsoft.com/office/officeart/2005/8/layout/chevron1"/>
@@ -5225,17 +5225,17 @@
     </dgm:pt>
   </dgm:ptLst>
   <dgm:cxnLst>
-    <dgm:cxn modelId="{5CAA056D-19E0-4048-8863-66EFD6D7860A}" srcId="{43E2B7A1-61E9-401B-A103-35447287B830}" destId="{0BC02535-0328-4002-A3FB-B8A773D0846A}" srcOrd="2" destOrd="0" parTransId="{406547D5-0518-43D7-953A-1406AAD7A93E}" sibTransId="{A20B4361-6AC8-4DB8-A2EE-F8FBF0D4BC95}"/>
+    <dgm:cxn modelId="{D3D68609-AFB3-45F4-A927-9E1E36E1ADB7}" srcId="{43E2B7A1-61E9-401B-A103-35447287B830}" destId="{143DE9F6-9345-4FC5-BDE1-871FE991D82A}" srcOrd="1" destOrd="0" parTransId="{BE05C30A-9B33-4972-8281-BC756A352B11}" sibTransId="{0F24F9C1-504D-4E89-964F-DA708A97717F}"/>
     <dgm:cxn modelId="{64D84D35-D400-4B49-B970-DE3027E479A4}" srcId="{43E2B7A1-61E9-401B-A103-35447287B830}" destId="{722F3EE7-F1ED-4747-BABE-D5193433A6C2}" srcOrd="0" destOrd="0" parTransId="{079B3C7F-773A-4569-8977-38CAD2A0016C}" sibTransId="{0A5DA1F5-A8B7-4259-A57A-00A859DB6313}"/>
-    <dgm:cxn modelId="{B63724F5-481D-4F4F-A101-D008EAE332F6}" type="presOf" srcId="{0BC02535-0328-4002-A3FB-B8A773D0846A}" destId="{B1AEBFC2-1EB2-48B2-961A-D6D324320C6D}" srcOrd="0" destOrd="0" presId="urn:microsoft.com/office/officeart/2005/8/layout/chevron1"/>
-    <dgm:cxn modelId="{647B2181-3BE6-4ADF-AE8A-215E5DC76A09}" type="presOf" srcId="{722F3EE7-F1ED-4747-BABE-D5193433A6C2}" destId="{7FAAC15B-B09D-4273-B8BB-7AA09C9943EB}" srcOrd="0" destOrd="0" presId="urn:microsoft.com/office/officeart/2005/8/layout/chevron1"/>
-    <dgm:cxn modelId="{2FD0916E-25AD-4056-9198-A85828860282}" srcId="{43E2B7A1-61E9-401B-A103-35447287B830}" destId="{FD5E0741-FA64-46D7-AFEB-24DAD5B2B0A2}" srcOrd="4" destOrd="0" parTransId="{F906B349-E2E6-42A3-9165-4D324AD22A30}" sibTransId="{3D7BF604-A829-41EB-81A7-AFD638E42082}"/>
     <dgm:cxn modelId="{7D1E9E39-B434-4F2E-851A-3BD2BD3AA327}" type="presOf" srcId="{143DE9F6-9345-4FC5-BDE1-871FE991D82A}" destId="{4ECCB1E8-A330-477B-920F-3C5B7E51EA28}" srcOrd="0" destOrd="0" presId="urn:microsoft.com/office/officeart/2005/8/layout/chevron1"/>
     <dgm:cxn modelId="{6871FF62-8AE0-4795-81ED-E187D332F61B}" srcId="{43E2B7A1-61E9-401B-A103-35447287B830}" destId="{D1D8320B-91D2-4486-9399-1F09FB851A26}" srcOrd="3" destOrd="0" parTransId="{C70193BE-8D38-4C88-8023-5ECBBA60061F}" sibTransId="{0D639B99-DF7C-4EE8-BB33-94D79B8695A4}"/>
-    <dgm:cxn modelId="{D3D68609-AFB3-45F4-A927-9E1E36E1ADB7}" srcId="{43E2B7A1-61E9-401B-A103-35447287B830}" destId="{143DE9F6-9345-4FC5-BDE1-871FE991D82A}" srcOrd="1" destOrd="0" parTransId="{BE05C30A-9B33-4972-8281-BC756A352B11}" sibTransId="{0F24F9C1-504D-4E89-964F-DA708A97717F}"/>
+    <dgm:cxn modelId="{5CAA056D-19E0-4048-8863-66EFD6D7860A}" srcId="{43E2B7A1-61E9-401B-A103-35447287B830}" destId="{0BC02535-0328-4002-A3FB-B8A773D0846A}" srcOrd="2" destOrd="0" parTransId="{406547D5-0518-43D7-953A-1406AAD7A93E}" sibTransId="{A20B4361-6AC8-4DB8-A2EE-F8FBF0D4BC95}"/>
+    <dgm:cxn modelId="{2FD0916E-25AD-4056-9198-A85828860282}" srcId="{43E2B7A1-61E9-401B-A103-35447287B830}" destId="{FD5E0741-FA64-46D7-AFEB-24DAD5B2B0A2}" srcOrd="4" destOrd="0" parTransId="{F906B349-E2E6-42A3-9165-4D324AD22A30}" sibTransId="{3D7BF604-A829-41EB-81A7-AFD638E42082}"/>
     <dgm:cxn modelId="{1B313D54-9B42-4184-91F7-6593AA3B55A4}" type="presOf" srcId="{FD5E0741-FA64-46D7-AFEB-24DAD5B2B0A2}" destId="{FB22FCAD-F17A-46F0-B4D6-E9D611223506}" srcOrd="0" destOrd="0" presId="urn:microsoft.com/office/officeart/2005/8/layout/chevron1"/>
+    <dgm:cxn modelId="{4508BC78-4DDA-4AA2-9305-0AAD624F732B}" type="presOf" srcId="{43E2B7A1-61E9-401B-A103-35447287B830}" destId="{364A076C-A699-46C5-9AEC-AB4BCAB43E30}" srcOrd="0" destOrd="0" presId="urn:microsoft.com/office/officeart/2005/8/layout/chevron1"/>
+    <dgm:cxn modelId="{647B2181-3BE6-4ADF-AE8A-215E5DC76A09}" type="presOf" srcId="{722F3EE7-F1ED-4747-BABE-D5193433A6C2}" destId="{7FAAC15B-B09D-4273-B8BB-7AA09C9943EB}" srcOrd="0" destOrd="0" presId="urn:microsoft.com/office/officeart/2005/8/layout/chevron1"/>
+    <dgm:cxn modelId="{B63724F5-481D-4F4F-A101-D008EAE332F6}" type="presOf" srcId="{0BC02535-0328-4002-A3FB-B8A773D0846A}" destId="{B1AEBFC2-1EB2-48B2-961A-D6D324320C6D}" srcOrd="0" destOrd="0" presId="urn:microsoft.com/office/officeart/2005/8/layout/chevron1"/>
     <dgm:cxn modelId="{723F4FFD-8F38-4C30-BC04-8B2208C6CC21}" type="presOf" srcId="{D1D8320B-91D2-4486-9399-1F09FB851A26}" destId="{0B9EDCF6-A386-4969-BCE7-DF6F75AF55A9}" srcOrd="0" destOrd="0" presId="urn:microsoft.com/office/officeart/2005/8/layout/chevron1"/>
-    <dgm:cxn modelId="{4508BC78-4DDA-4AA2-9305-0AAD624F732B}" type="presOf" srcId="{43E2B7A1-61E9-401B-A103-35447287B830}" destId="{364A076C-A699-46C5-9AEC-AB4BCAB43E30}" srcOrd="0" destOrd="0" presId="urn:microsoft.com/office/officeart/2005/8/layout/chevron1"/>
     <dgm:cxn modelId="{2498664A-AC63-42DC-B569-007B58BFBEF5}" type="presParOf" srcId="{364A076C-A699-46C5-9AEC-AB4BCAB43E30}" destId="{7FAAC15B-B09D-4273-B8BB-7AA09C9943EB}" srcOrd="0" destOrd="0" presId="urn:microsoft.com/office/officeart/2005/8/layout/chevron1"/>
     <dgm:cxn modelId="{21718BEF-CB92-4ACF-8657-9103B90BB3EC}" type="presParOf" srcId="{364A076C-A699-46C5-9AEC-AB4BCAB43E30}" destId="{72E59707-FD57-4ACB-ABFC-B168665EEEAF}" srcOrd="1" destOrd="0" presId="urn:microsoft.com/office/officeart/2005/8/layout/chevron1"/>
     <dgm:cxn modelId="{00F125B1-0BE4-4AE3-BD87-96274AB6A329}" type="presParOf" srcId="{364A076C-A699-46C5-9AEC-AB4BCAB43E30}" destId="{4ECCB1E8-A330-477B-920F-3C5B7E51EA28}" srcOrd="2" destOrd="0" presId="urn:microsoft.com/office/officeart/2005/8/layout/chevron1"/>
@@ -5546,17 +5546,17 @@
     </dgm:pt>
   </dgm:ptLst>
   <dgm:cxnLst>
+    <dgm:cxn modelId="{D3D68609-AFB3-45F4-A927-9E1E36E1ADB7}" srcId="{43E2B7A1-61E9-401B-A103-35447287B830}" destId="{143DE9F6-9345-4FC5-BDE1-871FE991D82A}" srcOrd="1" destOrd="0" parTransId="{BE05C30A-9B33-4972-8281-BC756A352B11}" sibTransId="{0F24F9C1-504D-4E89-964F-DA708A97717F}"/>
+    <dgm:cxn modelId="{D7D6231A-77C7-4088-A635-7042E86FB4DC}" type="presOf" srcId="{0BC02535-0328-4002-A3FB-B8A773D0846A}" destId="{B1AEBFC2-1EB2-48B2-961A-D6D324320C6D}" srcOrd="0" destOrd="0" presId="urn:microsoft.com/office/officeart/2005/8/layout/chevron1"/>
+    <dgm:cxn modelId="{22D5F71A-0DEC-4648-AF93-ADEBE10A9CF1}" type="presOf" srcId="{43E2B7A1-61E9-401B-A103-35447287B830}" destId="{364A076C-A699-46C5-9AEC-AB4BCAB43E30}" srcOrd="0" destOrd="0" presId="urn:microsoft.com/office/officeart/2005/8/layout/chevron1"/>
+    <dgm:cxn modelId="{B93FC722-EDDF-4376-B1FD-B2E7E10DE620}" type="presOf" srcId="{D1D8320B-91D2-4486-9399-1F09FB851A26}" destId="{0B9EDCF6-A386-4969-BCE7-DF6F75AF55A9}" srcOrd="0" destOrd="0" presId="urn:microsoft.com/office/officeart/2005/8/layout/chevron1"/>
+    <dgm:cxn modelId="{64D84D35-D400-4B49-B970-DE3027E479A4}" srcId="{43E2B7A1-61E9-401B-A103-35447287B830}" destId="{722F3EE7-F1ED-4747-BABE-D5193433A6C2}" srcOrd="0" destOrd="0" parTransId="{079B3C7F-773A-4569-8977-38CAD2A0016C}" sibTransId="{0A5DA1F5-A8B7-4259-A57A-00A859DB6313}"/>
+    <dgm:cxn modelId="{382E9741-4208-4BE4-8B44-4F032EC3EB9B}" type="presOf" srcId="{143DE9F6-9345-4FC5-BDE1-871FE991D82A}" destId="{4ECCB1E8-A330-477B-920F-3C5B7E51EA28}" srcOrd="0" destOrd="0" presId="urn:microsoft.com/office/officeart/2005/8/layout/chevron1"/>
+    <dgm:cxn modelId="{6871FF62-8AE0-4795-81ED-E187D332F61B}" srcId="{43E2B7A1-61E9-401B-A103-35447287B830}" destId="{D1D8320B-91D2-4486-9399-1F09FB851A26}" srcOrd="3" destOrd="0" parTransId="{C70193BE-8D38-4C88-8023-5ECBBA60061F}" sibTransId="{0D639B99-DF7C-4EE8-BB33-94D79B8695A4}"/>
+    <dgm:cxn modelId="{25A04243-7C61-4D55-861D-A7FB1DCC04AC}" type="presOf" srcId="{722F3EE7-F1ED-4747-BABE-D5193433A6C2}" destId="{7FAAC15B-B09D-4273-B8BB-7AA09C9943EB}" srcOrd="0" destOrd="0" presId="urn:microsoft.com/office/officeart/2005/8/layout/chevron1"/>
     <dgm:cxn modelId="{5CAA056D-19E0-4048-8863-66EFD6D7860A}" srcId="{43E2B7A1-61E9-401B-A103-35447287B830}" destId="{0BC02535-0328-4002-A3FB-B8A773D0846A}" srcOrd="2" destOrd="0" parTransId="{406547D5-0518-43D7-953A-1406AAD7A93E}" sibTransId="{A20B4361-6AC8-4DB8-A2EE-F8FBF0D4BC95}"/>
-    <dgm:cxn modelId="{64D84D35-D400-4B49-B970-DE3027E479A4}" srcId="{43E2B7A1-61E9-401B-A103-35447287B830}" destId="{722F3EE7-F1ED-4747-BABE-D5193433A6C2}" srcOrd="0" destOrd="0" parTransId="{079B3C7F-773A-4569-8977-38CAD2A0016C}" sibTransId="{0A5DA1F5-A8B7-4259-A57A-00A859DB6313}"/>
     <dgm:cxn modelId="{2C387D56-1D2A-40B5-92A9-B6FF3DCE7F10}" type="presOf" srcId="{7690DA45-5389-452C-9C5C-D94AF149D83E}" destId="{F030B5F4-7069-4A7C-8381-5DAA65062B89}" srcOrd="0" destOrd="0" presId="urn:microsoft.com/office/officeart/2005/8/layout/chevron1"/>
-    <dgm:cxn modelId="{382E9741-4208-4BE4-8B44-4F032EC3EB9B}" type="presOf" srcId="{143DE9F6-9345-4FC5-BDE1-871FE991D82A}" destId="{4ECCB1E8-A330-477B-920F-3C5B7E51EA28}" srcOrd="0" destOrd="0" presId="urn:microsoft.com/office/officeart/2005/8/layout/chevron1"/>
-    <dgm:cxn modelId="{25A04243-7C61-4D55-861D-A7FB1DCC04AC}" type="presOf" srcId="{722F3EE7-F1ED-4747-BABE-D5193433A6C2}" destId="{7FAAC15B-B09D-4273-B8BB-7AA09C9943EB}" srcOrd="0" destOrd="0" presId="urn:microsoft.com/office/officeart/2005/8/layout/chevron1"/>
-    <dgm:cxn modelId="{6871FF62-8AE0-4795-81ED-E187D332F61B}" srcId="{43E2B7A1-61E9-401B-A103-35447287B830}" destId="{D1D8320B-91D2-4486-9399-1F09FB851A26}" srcOrd="3" destOrd="0" parTransId="{C70193BE-8D38-4C88-8023-5ECBBA60061F}" sibTransId="{0D639B99-DF7C-4EE8-BB33-94D79B8695A4}"/>
-    <dgm:cxn modelId="{22D5F71A-0DEC-4648-AF93-ADEBE10A9CF1}" type="presOf" srcId="{43E2B7A1-61E9-401B-A103-35447287B830}" destId="{364A076C-A699-46C5-9AEC-AB4BCAB43E30}" srcOrd="0" destOrd="0" presId="urn:microsoft.com/office/officeart/2005/8/layout/chevron1"/>
-    <dgm:cxn modelId="{D3D68609-AFB3-45F4-A927-9E1E36E1ADB7}" srcId="{43E2B7A1-61E9-401B-A103-35447287B830}" destId="{143DE9F6-9345-4FC5-BDE1-871FE991D82A}" srcOrd="1" destOrd="0" parTransId="{BE05C30A-9B33-4972-8281-BC756A352B11}" sibTransId="{0F24F9C1-504D-4E89-964F-DA708A97717F}"/>
     <dgm:cxn modelId="{F64E71EB-B378-4322-81D9-D6D5E3F212A7}" srcId="{43E2B7A1-61E9-401B-A103-35447287B830}" destId="{7690DA45-5389-452C-9C5C-D94AF149D83E}" srcOrd="4" destOrd="0" parTransId="{B76F3A0B-BC98-4ECB-AABB-135CDF370858}" sibTransId="{DD4BF767-CFB6-46EE-9096-A2CEAC77D194}"/>
-    <dgm:cxn modelId="{D7D6231A-77C7-4088-A635-7042E86FB4DC}" type="presOf" srcId="{0BC02535-0328-4002-A3FB-B8A773D0846A}" destId="{B1AEBFC2-1EB2-48B2-961A-D6D324320C6D}" srcOrd="0" destOrd="0" presId="urn:microsoft.com/office/officeart/2005/8/layout/chevron1"/>
-    <dgm:cxn modelId="{B93FC722-EDDF-4376-B1FD-B2E7E10DE620}" type="presOf" srcId="{D1D8320B-91D2-4486-9399-1F09FB851A26}" destId="{0B9EDCF6-A386-4969-BCE7-DF6F75AF55A9}" srcOrd="0" destOrd="0" presId="urn:microsoft.com/office/officeart/2005/8/layout/chevron1"/>
     <dgm:cxn modelId="{D4BEE5A4-967C-4231-8E6E-0FF93A992939}" type="presParOf" srcId="{364A076C-A699-46C5-9AEC-AB4BCAB43E30}" destId="{7FAAC15B-B09D-4273-B8BB-7AA09C9943EB}" srcOrd="0" destOrd="0" presId="urn:microsoft.com/office/officeart/2005/8/layout/chevron1"/>
     <dgm:cxn modelId="{3E0B1D06-4E64-4648-BB86-1B38BDE66C35}" type="presParOf" srcId="{364A076C-A699-46C5-9AEC-AB4BCAB43E30}" destId="{72E59707-FD57-4ACB-ABFC-B168665EEEAF}" srcOrd="1" destOrd="0" presId="urn:microsoft.com/office/officeart/2005/8/layout/chevron1"/>
     <dgm:cxn modelId="{14CA14B0-DDC4-4A79-9FA4-7B9B4E292E0C}" type="presParOf" srcId="{364A076C-A699-46C5-9AEC-AB4BCAB43E30}" destId="{4ECCB1E8-A330-477B-920F-3C5B7E51EA28}" srcOrd="2" destOrd="0" presId="urn:microsoft.com/office/officeart/2005/8/layout/chevron1"/>
@@ -5865,17 +5865,17 @@
     </dgm:pt>
   </dgm:ptLst>
   <dgm:cxnLst>
+    <dgm:cxn modelId="{6F1A5909-E60B-4A64-BACE-6DFD7ACCF647}" type="presOf" srcId="{D1D8320B-91D2-4486-9399-1F09FB851A26}" destId="{0B9EDCF6-A386-4969-BCE7-DF6F75AF55A9}" srcOrd="0" destOrd="0" presId="urn:microsoft.com/office/officeart/2005/8/layout/chevron1"/>
+    <dgm:cxn modelId="{D3D68609-AFB3-45F4-A927-9E1E36E1ADB7}" srcId="{43E2B7A1-61E9-401B-A103-35447287B830}" destId="{143DE9F6-9345-4FC5-BDE1-871FE991D82A}" srcOrd="1" destOrd="0" parTransId="{BE05C30A-9B33-4972-8281-BC756A352B11}" sibTransId="{0F24F9C1-504D-4E89-964F-DA708A97717F}"/>
+    <dgm:cxn modelId="{926D010F-471D-4503-A02F-5847B24B406E}" srcId="{43E2B7A1-61E9-401B-A103-35447287B830}" destId="{ECBA45AD-075F-42FD-9DDD-A3F7CE0FBDC6}" srcOrd="4" destOrd="0" parTransId="{2E8F27D6-289C-40A9-B057-954D2BCBC0D0}" sibTransId="{9D2EC7AC-0EF2-4221-BA98-F65DE531A9F0}"/>
+    <dgm:cxn modelId="{9D644E1D-8046-483A-9C8C-A2EFE5F6CAF3}" type="presOf" srcId="{0BC02535-0328-4002-A3FB-B8A773D0846A}" destId="{B1AEBFC2-1EB2-48B2-961A-D6D324320C6D}" srcOrd="0" destOrd="0" presId="urn:microsoft.com/office/officeart/2005/8/layout/chevron1"/>
+    <dgm:cxn modelId="{18752923-5B47-4DC3-BB1C-537AAC1634AA}" type="presOf" srcId="{ECBA45AD-075F-42FD-9DDD-A3F7CE0FBDC6}" destId="{A1862056-9954-454F-83F5-F4F451AAA23D}" srcOrd="0" destOrd="0" presId="urn:microsoft.com/office/officeart/2005/8/layout/chevron1"/>
+    <dgm:cxn modelId="{64D84D35-D400-4B49-B970-DE3027E479A4}" srcId="{43E2B7A1-61E9-401B-A103-35447287B830}" destId="{722F3EE7-F1ED-4747-BABE-D5193433A6C2}" srcOrd="0" destOrd="0" parTransId="{079B3C7F-773A-4569-8977-38CAD2A0016C}" sibTransId="{0A5DA1F5-A8B7-4259-A57A-00A859DB6313}"/>
+    <dgm:cxn modelId="{6871FF62-8AE0-4795-81ED-E187D332F61B}" srcId="{43E2B7A1-61E9-401B-A103-35447287B830}" destId="{D1D8320B-91D2-4486-9399-1F09FB851A26}" srcOrd="3" destOrd="0" parTransId="{C70193BE-8D38-4C88-8023-5ECBBA60061F}" sibTransId="{0D639B99-DF7C-4EE8-BB33-94D79B8695A4}"/>
     <dgm:cxn modelId="{5CAA056D-19E0-4048-8863-66EFD6D7860A}" srcId="{43E2B7A1-61E9-401B-A103-35447287B830}" destId="{0BC02535-0328-4002-A3FB-B8A773D0846A}" srcOrd="2" destOrd="0" parTransId="{406547D5-0518-43D7-953A-1406AAD7A93E}" sibTransId="{A20B4361-6AC8-4DB8-A2EE-F8FBF0D4BC95}"/>
-    <dgm:cxn modelId="{9D644E1D-8046-483A-9C8C-A2EFE5F6CAF3}" type="presOf" srcId="{0BC02535-0328-4002-A3FB-B8A773D0846A}" destId="{B1AEBFC2-1EB2-48B2-961A-D6D324320C6D}" srcOrd="0" destOrd="0" presId="urn:microsoft.com/office/officeart/2005/8/layout/chevron1"/>
-    <dgm:cxn modelId="{64D84D35-D400-4B49-B970-DE3027E479A4}" srcId="{43E2B7A1-61E9-401B-A103-35447287B830}" destId="{722F3EE7-F1ED-4747-BABE-D5193433A6C2}" srcOrd="0" destOrd="0" parTransId="{079B3C7F-773A-4569-8977-38CAD2A0016C}" sibTransId="{0A5DA1F5-A8B7-4259-A57A-00A859DB6313}"/>
     <dgm:cxn modelId="{057F6079-FCF4-450D-82A5-22EA1F020830}" type="presOf" srcId="{43E2B7A1-61E9-401B-A103-35447287B830}" destId="{364A076C-A699-46C5-9AEC-AB4BCAB43E30}" srcOrd="0" destOrd="0" presId="urn:microsoft.com/office/officeart/2005/8/layout/chevron1"/>
-    <dgm:cxn modelId="{926D010F-471D-4503-A02F-5847B24B406E}" srcId="{43E2B7A1-61E9-401B-A103-35447287B830}" destId="{ECBA45AD-075F-42FD-9DDD-A3F7CE0FBDC6}" srcOrd="4" destOrd="0" parTransId="{2E8F27D6-289C-40A9-B057-954D2BCBC0D0}" sibTransId="{9D2EC7AC-0EF2-4221-BA98-F65DE531A9F0}"/>
-    <dgm:cxn modelId="{18752923-5B47-4DC3-BB1C-537AAC1634AA}" type="presOf" srcId="{ECBA45AD-075F-42FD-9DDD-A3F7CE0FBDC6}" destId="{A1862056-9954-454F-83F5-F4F451AAA23D}" srcOrd="0" destOrd="0" presId="urn:microsoft.com/office/officeart/2005/8/layout/chevron1"/>
     <dgm:cxn modelId="{E84EBA85-7B2F-448C-90A8-BEB4652EAB87}" type="presOf" srcId="{143DE9F6-9345-4FC5-BDE1-871FE991D82A}" destId="{4ECCB1E8-A330-477B-920F-3C5B7E51EA28}" srcOrd="0" destOrd="0" presId="urn:microsoft.com/office/officeart/2005/8/layout/chevron1"/>
-    <dgm:cxn modelId="{6871FF62-8AE0-4795-81ED-E187D332F61B}" srcId="{43E2B7A1-61E9-401B-A103-35447287B830}" destId="{D1D8320B-91D2-4486-9399-1F09FB851A26}" srcOrd="3" destOrd="0" parTransId="{C70193BE-8D38-4C88-8023-5ECBBA60061F}" sibTransId="{0D639B99-DF7C-4EE8-BB33-94D79B8695A4}"/>
     <dgm:cxn modelId="{3F006EC0-C637-40E7-8085-7509C04A20A6}" type="presOf" srcId="{722F3EE7-F1ED-4747-BABE-D5193433A6C2}" destId="{7FAAC15B-B09D-4273-B8BB-7AA09C9943EB}" srcOrd="0" destOrd="0" presId="urn:microsoft.com/office/officeart/2005/8/layout/chevron1"/>
-    <dgm:cxn modelId="{D3D68609-AFB3-45F4-A927-9E1E36E1ADB7}" srcId="{43E2B7A1-61E9-401B-A103-35447287B830}" destId="{143DE9F6-9345-4FC5-BDE1-871FE991D82A}" srcOrd="1" destOrd="0" parTransId="{BE05C30A-9B33-4972-8281-BC756A352B11}" sibTransId="{0F24F9C1-504D-4E89-964F-DA708A97717F}"/>
-    <dgm:cxn modelId="{6F1A5909-E60B-4A64-BACE-6DFD7ACCF647}" type="presOf" srcId="{D1D8320B-91D2-4486-9399-1F09FB851A26}" destId="{0B9EDCF6-A386-4969-BCE7-DF6F75AF55A9}" srcOrd="0" destOrd="0" presId="urn:microsoft.com/office/officeart/2005/8/layout/chevron1"/>
     <dgm:cxn modelId="{FE04B7CC-42D3-418A-954F-E462A4A82831}" type="presParOf" srcId="{364A076C-A699-46C5-9AEC-AB4BCAB43E30}" destId="{7FAAC15B-B09D-4273-B8BB-7AA09C9943EB}" srcOrd="0" destOrd="0" presId="urn:microsoft.com/office/officeart/2005/8/layout/chevron1"/>
     <dgm:cxn modelId="{E25CC40F-24FF-4D86-8ABA-747603B60535}" type="presParOf" srcId="{364A076C-A699-46C5-9AEC-AB4BCAB43E30}" destId="{72E59707-FD57-4ACB-ABFC-B168665EEEAF}" srcOrd="1" destOrd="0" presId="urn:microsoft.com/office/officeart/2005/8/layout/chevron1"/>
     <dgm:cxn modelId="{788D0B31-E69C-4EE6-B9BB-A453D80154DB}" type="presParOf" srcId="{364A076C-A699-46C5-9AEC-AB4BCAB43E30}" destId="{4ECCB1E8-A330-477B-920F-3C5B7E51EA28}" srcOrd="2" destOrd="0" presId="urn:microsoft.com/office/officeart/2005/8/layout/chevron1"/>
@@ -6186,17 +6186,17 @@
     </dgm:pt>
   </dgm:ptLst>
   <dgm:cxnLst>
+    <dgm:cxn modelId="{6F1A5909-E60B-4A64-BACE-6DFD7ACCF647}" type="presOf" srcId="{D1D8320B-91D2-4486-9399-1F09FB851A26}" destId="{0B9EDCF6-A386-4969-BCE7-DF6F75AF55A9}" srcOrd="0" destOrd="0" presId="urn:microsoft.com/office/officeart/2005/8/layout/chevron1"/>
+    <dgm:cxn modelId="{D3D68609-AFB3-45F4-A927-9E1E36E1ADB7}" srcId="{43E2B7A1-61E9-401B-A103-35447287B830}" destId="{143DE9F6-9345-4FC5-BDE1-871FE991D82A}" srcOrd="1" destOrd="0" parTransId="{BE05C30A-9B33-4972-8281-BC756A352B11}" sibTransId="{0F24F9C1-504D-4E89-964F-DA708A97717F}"/>
+    <dgm:cxn modelId="{926D010F-471D-4503-A02F-5847B24B406E}" srcId="{43E2B7A1-61E9-401B-A103-35447287B830}" destId="{ECBA45AD-075F-42FD-9DDD-A3F7CE0FBDC6}" srcOrd="4" destOrd="0" parTransId="{2E8F27D6-289C-40A9-B057-954D2BCBC0D0}" sibTransId="{9D2EC7AC-0EF2-4221-BA98-F65DE531A9F0}"/>
+    <dgm:cxn modelId="{9D644E1D-8046-483A-9C8C-A2EFE5F6CAF3}" type="presOf" srcId="{0BC02535-0328-4002-A3FB-B8A773D0846A}" destId="{B1AEBFC2-1EB2-48B2-961A-D6D324320C6D}" srcOrd="0" destOrd="0" presId="urn:microsoft.com/office/officeart/2005/8/layout/chevron1"/>
+    <dgm:cxn modelId="{18752923-5B47-4DC3-BB1C-537AAC1634AA}" type="presOf" srcId="{ECBA45AD-075F-42FD-9DDD-A3F7CE0FBDC6}" destId="{A1862056-9954-454F-83F5-F4F451AAA23D}" srcOrd="0" destOrd="0" presId="urn:microsoft.com/office/officeart/2005/8/layout/chevron1"/>
+    <dgm:cxn modelId="{64D84D35-D400-4B49-B970-DE3027E479A4}" srcId="{43E2B7A1-61E9-401B-A103-35447287B830}" destId="{722F3EE7-F1ED-4747-BABE-D5193433A6C2}" srcOrd="0" destOrd="0" parTransId="{079B3C7F-773A-4569-8977-38CAD2A0016C}" sibTransId="{0A5DA1F5-A8B7-4259-A57A-00A859DB6313}"/>
+    <dgm:cxn modelId="{6871FF62-8AE0-4795-81ED-E187D332F61B}" srcId="{43E2B7A1-61E9-401B-A103-35447287B830}" destId="{D1D8320B-91D2-4486-9399-1F09FB851A26}" srcOrd="3" destOrd="0" parTransId="{C70193BE-8D38-4C88-8023-5ECBBA60061F}" sibTransId="{0D639B99-DF7C-4EE8-BB33-94D79B8695A4}"/>
     <dgm:cxn modelId="{5CAA056D-19E0-4048-8863-66EFD6D7860A}" srcId="{43E2B7A1-61E9-401B-A103-35447287B830}" destId="{0BC02535-0328-4002-A3FB-B8A773D0846A}" srcOrd="2" destOrd="0" parTransId="{406547D5-0518-43D7-953A-1406AAD7A93E}" sibTransId="{A20B4361-6AC8-4DB8-A2EE-F8FBF0D4BC95}"/>
-    <dgm:cxn modelId="{9D644E1D-8046-483A-9C8C-A2EFE5F6CAF3}" type="presOf" srcId="{0BC02535-0328-4002-A3FB-B8A773D0846A}" destId="{B1AEBFC2-1EB2-48B2-961A-D6D324320C6D}" srcOrd="0" destOrd="0" presId="urn:microsoft.com/office/officeart/2005/8/layout/chevron1"/>
-    <dgm:cxn modelId="{64D84D35-D400-4B49-B970-DE3027E479A4}" srcId="{43E2B7A1-61E9-401B-A103-35447287B830}" destId="{722F3EE7-F1ED-4747-BABE-D5193433A6C2}" srcOrd="0" destOrd="0" parTransId="{079B3C7F-773A-4569-8977-38CAD2A0016C}" sibTransId="{0A5DA1F5-A8B7-4259-A57A-00A859DB6313}"/>
     <dgm:cxn modelId="{057F6079-FCF4-450D-82A5-22EA1F020830}" type="presOf" srcId="{43E2B7A1-61E9-401B-A103-35447287B830}" destId="{364A076C-A699-46C5-9AEC-AB4BCAB43E30}" srcOrd="0" destOrd="0" presId="urn:microsoft.com/office/officeart/2005/8/layout/chevron1"/>
-    <dgm:cxn modelId="{926D010F-471D-4503-A02F-5847B24B406E}" srcId="{43E2B7A1-61E9-401B-A103-35447287B830}" destId="{ECBA45AD-075F-42FD-9DDD-A3F7CE0FBDC6}" srcOrd="4" destOrd="0" parTransId="{2E8F27D6-289C-40A9-B057-954D2BCBC0D0}" sibTransId="{9D2EC7AC-0EF2-4221-BA98-F65DE531A9F0}"/>
-    <dgm:cxn modelId="{18752923-5B47-4DC3-BB1C-537AAC1634AA}" type="presOf" srcId="{ECBA45AD-075F-42FD-9DDD-A3F7CE0FBDC6}" destId="{A1862056-9954-454F-83F5-F4F451AAA23D}" srcOrd="0" destOrd="0" presId="urn:microsoft.com/office/officeart/2005/8/layout/chevron1"/>
     <dgm:cxn modelId="{E84EBA85-7B2F-448C-90A8-BEB4652EAB87}" type="presOf" srcId="{143DE9F6-9345-4FC5-BDE1-871FE991D82A}" destId="{4ECCB1E8-A330-477B-920F-3C5B7E51EA28}" srcOrd="0" destOrd="0" presId="urn:microsoft.com/office/officeart/2005/8/layout/chevron1"/>
-    <dgm:cxn modelId="{6871FF62-8AE0-4795-81ED-E187D332F61B}" srcId="{43E2B7A1-61E9-401B-A103-35447287B830}" destId="{D1D8320B-91D2-4486-9399-1F09FB851A26}" srcOrd="3" destOrd="0" parTransId="{C70193BE-8D38-4C88-8023-5ECBBA60061F}" sibTransId="{0D639B99-DF7C-4EE8-BB33-94D79B8695A4}"/>
     <dgm:cxn modelId="{3F006EC0-C637-40E7-8085-7509C04A20A6}" type="presOf" srcId="{722F3EE7-F1ED-4747-BABE-D5193433A6C2}" destId="{7FAAC15B-B09D-4273-B8BB-7AA09C9943EB}" srcOrd="0" destOrd="0" presId="urn:microsoft.com/office/officeart/2005/8/layout/chevron1"/>
-    <dgm:cxn modelId="{D3D68609-AFB3-45F4-A927-9E1E36E1ADB7}" srcId="{43E2B7A1-61E9-401B-A103-35447287B830}" destId="{143DE9F6-9345-4FC5-BDE1-871FE991D82A}" srcOrd="1" destOrd="0" parTransId="{BE05C30A-9B33-4972-8281-BC756A352B11}" sibTransId="{0F24F9C1-504D-4E89-964F-DA708A97717F}"/>
-    <dgm:cxn modelId="{6F1A5909-E60B-4A64-BACE-6DFD7ACCF647}" type="presOf" srcId="{D1D8320B-91D2-4486-9399-1F09FB851A26}" destId="{0B9EDCF6-A386-4969-BCE7-DF6F75AF55A9}" srcOrd="0" destOrd="0" presId="urn:microsoft.com/office/officeart/2005/8/layout/chevron1"/>
     <dgm:cxn modelId="{FE04B7CC-42D3-418A-954F-E462A4A82831}" type="presParOf" srcId="{364A076C-A699-46C5-9AEC-AB4BCAB43E30}" destId="{7FAAC15B-B09D-4273-B8BB-7AA09C9943EB}" srcOrd="0" destOrd="0" presId="urn:microsoft.com/office/officeart/2005/8/layout/chevron1"/>
     <dgm:cxn modelId="{E25CC40F-24FF-4D86-8ABA-747603B60535}" type="presParOf" srcId="{364A076C-A699-46C5-9AEC-AB4BCAB43E30}" destId="{72E59707-FD57-4ACB-ABFC-B168665EEEAF}" srcOrd="1" destOrd="0" presId="urn:microsoft.com/office/officeart/2005/8/layout/chevron1"/>
     <dgm:cxn modelId="{788D0B31-E69C-4EE6-B9BB-A453D80154DB}" type="presParOf" srcId="{364A076C-A699-46C5-9AEC-AB4BCAB43E30}" destId="{4ECCB1E8-A330-477B-920F-3C5B7E51EA28}" srcOrd="2" destOrd="0" presId="urn:microsoft.com/office/officeart/2005/8/layout/chevron1"/>
@@ -6460,15 +6460,15 @@
     </dgm:pt>
   </dgm:ptLst>
   <dgm:cxnLst>
+    <dgm:cxn modelId="{DD3E080B-33E6-43CC-8997-28C19DAD16B5}" type="presOf" srcId="{B138B07E-0C92-4E33-AF6F-BAE71D9049D8}" destId="{999E5ABE-CD00-4E0A-B3FD-EE0F9B45D0EF}" srcOrd="0" destOrd="0" presId="urn:microsoft.com/office/officeart/2005/8/layout/chevron1"/>
+    <dgm:cxn modelId="{78112C30-1C59-48D8-B4F8-AE055777C04F}" srcId="{A183374D-C78D-43A3-A970-7BCE64E6A380}" destId="{723B0B2B-4CD2-4F0B-A7BD-9F4D7B1DB527}" srcOrd="3" destOrd="0" parTransId="{59D5EFFC-4827-4D8D-91F6-B86896DA6CAC}" sibTransId="{A2200CB8-AEC4-4699-9B03-92814C123C6C}"/>
+    <dgm:cxn modelId="{0C461D42-5423-4C71-88CC-F4E73D4A9CDD}" type="presOf" srcId="{3E815AAE-6AB7-4D8C-B99E-DF18341AA3D9}" destId="{A0BACE3D-FFD9-4895-A746-C9E6756C0807}" srcOrd="0" destOrd="0" presId="urn:microsoft.com/office/officeart/2005/8/layout/chevron1"/>
+    <dgm:cxn modelId="{E1CC8E59-1E06-4AF0-8475-4FCD7E223559}" type="presOf" srcId="{723B0B2B-4CD2-4F0B-A7BD-9F4D7B1DB527}" destId="{63B49E9E-B2E6-432C-ACE5-9FA7EEBDE9A2}" srcOrd="0" destOrd="0" presId="urn:microsoft.com/office/officeart/2005/8/layout/chevron1"/>
+    <dgm:cxn modelId="{2988DDAE-E440-4F46-A609-D2985010C355}" type="presOf" srcId="{A183374D-C78D-43A3-A970-7BCE64E6A380}" destId="{DA49572B-217B-4DCB-B01E-047FB3ADD7F3}" srcOrd="0" destOrd="0" presId="urn:microsoft.com/office/officeart/2005/8/layout/chevron1"/>
+    <dgm:cxn modelId="{93025BD8-A6AC-4512-8377-78702A5E6D40}" srcId="{A183374D-C78D-43A3-A970-7BCE64E6A380}" destId="{B138B07E-0C92-4E33-AF6F-BAE71D9049D8}" srcOrd="2" destOrd="0" parTransId="{C560D590-CB2D-46D0-9795-D8772EF17100}" sibTransId="{75FB62BA-C492-4E0B-A068-33386135CECC}"/>
     <dgm:cxn modelId="{FC73D4D9-7DFF-4BBA-A06F-F860813712EA}" type="presOf" srcId="{7B8A7451-AF37-44EC-8564-767A5B35EDE3}" destId="{5F0077E2-EE8C-4A62-9198-611113A0F425}" srcOrd="0" destOrd="0" presId="urn:microsoft.com/office/officeart/2005/8/layout/chevron1"/>
-    <dgm:cxn modelId="{78112C30-1C59-48D8-B4F8-AE055777C04F}" srcId="{A183374D-C78D-43A3-A970-7BCE64E6A380}" destId="{723B0B2B-4CD2-4F0B-A7BD-9F4D7B1DB527}" srcOrd="3" destOrd="0" parTransId="{59D5EFFC-4827-4D8D-91F6-B86896DA6CAC}" sibTransId="{A2200CB8-AEC4-4699-9B03-92814C123C6C}"/>
     <dgm:cxn modelId="{80F216F4-BCB6-46E7-ADF0-DDEFFD7B5DB4}" srcId="{A183374D-C78D-43A3-A970-7BCE64E6A380}" destId="{7B8A7451-AF37-44EC-8564-767A5B35EDE3}" srcOrd="0" destOrd="0" parTransId="{E9DF24BA-78D5-47AD-8F9F-0909E5BCC87B}" sibTransId="{C294AFD5-15E6-4620-930D-5BDE4132D1D5}"/>
-    <dgm:cxn modelId="{0C461D42-5423-4C71-88CC-F4E73D4A9CDD}" type="presOf" srcId="{3E815AAE-6AB7-4D8C-B99E-DF18341AA3D9}" destId="{A0BACE3D-FFD9-4895-A746-C9E6756C0807}" srcOrd="0" destOrd="0" presId="urn:microsoft.com/office/officeart/2005/8/layout/chevron1"/>
-    <dgm:cxn modelId="{DD3E080B-33E6-43CC-8997-28C19DAD16B5}" type="presOf" srcId="{B138B07E-0C92-4E33-AF6F-BAE71D9049D8}" destId="{999E5ABE-CD00-4E0A-B3FD-EE0F9B45D0EF}" srcOrd="0" destOrd="0" presId="urn:microsoft.com/office/officeart/2005/8/layout/chevron1"/>
-    <dgm:cxn modelId="{E1CC8E59-1E06-4AF0-8475-4FCD7E223559}" type="presOf" srcId="{723B0B2B-4CD2-4F0B-A7BD-9F4D7B1DB527}" destId="{63B49E9E-B2E6-432C-ACE5-9FA7EEBDE9A2}" srcOrd="0" destOrd="0" presId="urn:microsoft.com/office/officeart/2005/8/layout/chevron1"/>
-    <dgm:cxn modelId="{93025BD8-A6AC-4512-8377-78702A5E6D40}" srcId="{A183374D-C78D-43A3-A970-7BCE64E6A380}" destId="{B138B07E-0C92-4E33-AF6F-BAE71D9049D8}" srcOrd="2" destOrd="0" parTransId="{C560D590-CB2D-46D0-9795-D8772EF17100}" sibTransId="{75FB62BA-C492-4E0B-A068-33386135CECC}"/>
     <dgm:cxn modelId="{498F6BFE-7981-406D-81FE-272BD405F8EE}" srcId="{A183374D-C78D-43A3-A970-7BCE64E6A380}" destId="{3E815AAE-6AB7-4D8C-B99E-DF18341AA3D9}" srcOrd="1" destOrd="0" parTransId="{1C424F74-B4FF-4345-A37D-66F584835AB8}" sibTransId="{1EECE6D5-FC46-4860-9CD6-22498978B359}"/>
-    <dgm:cxn modelId="{2988DDAE-E440-4F46-A609-D2985010C355}" type="presOf" srcId="{A183374D-C78D-43A3-A970-7BCE64E6A380}" destId="{DA49572B-217B-4DCB-B01E-047FB3ADD7F3}" srcOrd="0" destOrd="0" presId="urn:microsoft.com/office/officeart/2005/8/layout/chevron1"/>
     <dgm:cxn modelId="{FC8F9ACC-EC0A-4516-B1F2-9C5734010C60}" type="presParOf" srcId="{DA49572B-217B-4DCB-B01E-047FB3ADD7F3}" destId="{5F0077E2-EE8C-4A62-9198-611113A0F425}" srcOrd="0" destOrd="0" presId="urn:microsoft.com/office/officeart/2005/8/layout/chevron1"/>
     <dgm:cxn modelId="{A0C64FB6-8EC4-40D8-A5A4-689DC61A5627}" type="presParOf" srcId="{DA49572B-217B-4DCB-B01E-047FB3ADD7F3}" destId="{03164F68-5029-41E0-A260-E2A9243D4F99}" srcOrd="1" destOrd="0" presId="urn:microsoft.com/office/officeart/2005/8/layout/chevron1"/>
     <dgm:cxn modelId="{00974CFF-EB1E-4EFA-897C-F6F4F4AB04B4}" type="presParOf" srcId="{DA49572B-217B-4DCB-B01E-047FB3ADD7F3}" destId="{A0BACE3D-FFD9-4895-A746-C9E6756C0807}" srcOrd="2" destOrd="0" presId="urn:microsoft.com/office/officeart/2005/8/layout/chevron1"/>
@@ -16669,7 +16669,7 @@
           <a:p>
             <a:fld id="{B3BF51E1-E418-4EEC-836E-5CFF5E7A6C5B}" type="datetimeFigureOut">
               <a:rPr lang="de-DE" smtClean="0"/>
-              <a:t>22.01.2017</a:t>
+              <a:t>31.03.2017</a:t>
             </a:fld>
             <a:endParaRPr lang="de-DE"/>
           </a:p>
@@ -16834,7 +16834,7 @@
           <a:p>
             <a:fld id="{AAE480F6-1629-4183-9B8E-99B98793D212}" type="datetimeFigureOut">
               <a:rPr lang="de-DE" smtClean="0"/>
-              <a:t>22.01.2017</a:t>
+              <a:t>31.03.2017</a:t>
             </a:fld>
             <a:endParaRPr lang="de-DE"/>
           </a:p>
@@ -43766,7 +43766,7 @@
           <a:lstStyle/>
           <a:p>
             <a:r>
-              <a:rPr lang="de-DE"/>
+              <a:rPr lang="de-DE" dirty="0"/>
               <a:t>Florian Blessing, Lisa Böhler, Markus Götz, Jan Habersetzer, Wendelin Herrmann</a:t>
             </a:r>
           </a:p>
@@ -43856,6 +43856,43 @@
           <a:p>
             <a:pPr algn="ctr"/>
             <a:endParaRPr lang="de-DE"/>
+          </a:p>
+        </p:txBody>
+      </p:sp>
+      <p:sp>
+        <p:nvSpPr>
+          <p:cNvPr id="2" name="Textfeld 1"/>
+          <p:cNvSpPr txBox="1"/>
+          <p:nvPr/>
+        </p:nvSpPr>
+        <p:spPr>
+          <a:xfrm>
+            <a:off x="8950036" y="5606477"/>
+            <a:ext cx="2909454" cy="523220"/>
+          </a:xfrm>
+          <a:prstGeom prst="rect">
+            <a:avLst/>
+          </a:prstGeom>
+          <a:noFill/>
+        </p:spPr>
+        <p:txBody>
+          <a:bodyPr wrap="square" rtlCol="0">
+            <a:spAutoFit/>
+          </a:bodyPr>
+          <a:lstStyle/>
+          <a:p>
+            <a:r>
+              <a:rPr lang="de-DE" sz="1400" dirty="0"/>
+              <a:t>Abb. 1: Grobarchitektur des </a:t>
+            </a:r>
+            <a:br>
+              <a:rPr lang="de-DE" sz="1400" dirty="0"/>
+            </a:br>
+            <a:r>
+              <a:rPr lang="de-DE" sz="1400" dirty="0"/>
+              <a:t>Zielsystems (Rathke und Thies 2017)</a:t>
+            </a:r>
+            <a:endParaRPr lang="de-DE" dirty="0"/>
           </a:p>
         </p:txBody>
       </p:sp>

</xml_diff>